<commit_message>
cambio caso de uso con modelo de datos
</commit_message>
<xml_diff>
--- a/sigset/documentos/Documentos finales/Presentacion.pptx
+++ b/sigset/documentos/Documentos finales/Presentacion.pptx
@@ -28,8 +28,8 @@
     <p:sldId id="352" r:id="rId16"/>
     <p:sldId id="353" r:id="rId17"/>
     <p:sldId id="354" r:id="rId18"/>
-    <p:sldId id="355" r:id="rId19"/>
-    <p:sldId id="364" r:id="rId20"/>
+    <p:sldId id="364" r:id="rId19"/>
+    <p:sldId id="355" r:id="rId20"/>
     <p:sldId id="372" r:id="rId21"/>
     <p:sldId id="357" r:id="rId22"/>
     <p:sldId id="337" r:id="rId23"/>
@@ -5842,13 +5842,7 @@
             <a:rPr lang="es-CL" dirty="0" smtClean="0">
               <a:latin typeface="Futura Lt BT"/>
             </a:rPr>
-            <a:t>SQL </a:t>
-          </a:r>
-          <a:r>
-            <a:rPr lang="es-CL" dirty="0" smtClean="0">
-              <a:latin typeface="Futura Lt BT"/>
-            </a:rPr>
-            <a:t>Server 2005</a:t>
+            <a:t>SQL Server 2005</a:t>
           </a:r>
           <a:endParaRPr lang="es-CL" dirty="0">
             <a:latin typeface="Futura Lt BT"/>
@@ -6884,19 +6878,7 @@
             <a:rPr lang="es-CL" dirty="0" smtClean="0">
               <a:latin typeface="Futura Lt BT"/>
             </a:rPr>
-            <a:t>SQL </a:t>
-          </a:r>
-          <a:r>
-            <a:rPr lang="es-CL" dirty="0" smtClean="0">
-              <a:latin typeface="Futura Lt BT"/>
-            </a:rPr>
-            <a:t>Server 2005 </a:t>
-          </a:r>
-          <a:r>
-            <a:rPr lang="es-CL" dirty="0" smtClean="0">
-              <a:latin typeface="Futura Lt BT"/>
-            </a:rPr>
-            <a:t>Estándar</a:t>
+            <a:t>SQL Server 2005 Estándar</a:t>
           </a:r>
           <a:endParaRPr lang="es-CL" dirty="0">
             <a:latin typeface="Futura Lt BT"/>
@@ -6941,19 +6923,7 @@
             <a:rPr lang="es-CL" dirty="0" smtClean="0">
               <a:latin typeface="Futura Lt BT"/>
             </a:rPr>
-            <a:t>SQL </a:t>
-          </a:r>
-          <a:r>
-            <a:rPr lang="es-CL" dirty="0" smtClean="0">
-              <a:latin typeface="Futura Lt BT"/>
-            </a:rPr>
-            <a:t>Server 2005 </a:t>
-          </a:r>
-          <a:r>
-            <a:rPr lang="es-CL" dirty="0" smtClean="0">
-              <a:latin typeface="Futura Lt BT"/>
-            </a:rPr>
-            <a:t>Express</a:t>
+            <a:t>SQL Server 2005 Express</a:t>
           </a:r>
           <a:endParaRPr lang="es-CL" dirty="0">
             <a:latin typeface="Futura Lt BT"/>
@@ -7520,8 +7490,8 @@
     <dgm:cxn modelId="{009F14D6-CA1E-4C51-9A0D-B3F9C1E49D18}" srcId="{8C966F34-B6FE-4951-A5DC-B6B890C24F40}" destId="{3E04EA27-BE6A-44A3-A3D4-2CA4C32FFFF1}" srcOrd="0" destOrd="0" parTransId="{AE75B588-956D-4795-8BBA-14C526926D85}" sibTransId="{95BE6102-EEB0-4432-978E-FF1B073DB7AE}"/>
     <dgm:cxn modelId="{7C45ECE9-8356-43E2-B614-D776DF3DC2DF}" srcId="{393E7F46-B313-4E77-9797-D22D41EC5A03}" destId="{C9CB3786-0DB1-4998-9BFA-7ECC9C5F0DDE}" srcOrd="0" destOrd="0" parTransId="{0E603B5F-E788-4075-9EE8-6B92BD9BB1C6}" sibTransId="{7DBE4023-B152-423B-8602-7781CB8577AE}"/>
     <dgm:cxn modelId="{408049A4-04EC-42E5-AF64-48679D607DD0}" srcId="{3E04EA27-BE6A-44A3-A3D4-2CA4C32FFFF1}" destId="{FF7302D4-DF56-4D05-A039-49D494387244}" srcOrd="0" destOrd="0" parTransId="{D4A43A0A-08CA-47F1-8162-BEC510EB34F5}" sibTransId="{2DF987A6-F136-45BC-97D9-2328C9ACEA14}"/>
+    <dgm:cxn modelId="{730F44F3-0F16-4DC7-94FF-A657B4144452}" type="presOf" srcId="{FF7302D4-DF56-4D05-A039-49D494387244}" destId="{97C6F11A-5991-412B-8918-0D15E3AC825F}" srcOrd="0" destOrd="1" presId="urn:microsoft.com/office/officeart/2005/8/layout/hierarchy3"/>
     <dgm:cxn modelId="{CA8B197C-6DF2-4384-8BED-6C6211A4692F}" type="presOf" srcId="{28182505-8186-4B77-AAED-7D73BD2EC62F}" destId="{59A576FD-DEA1-4973-B0CA-89D07BC9EE75}" srcOrd="0" destOrd="0" presId="urn:microsoft.com/office/officeart/2005/8/layout/hierarchy3"/>
-    <dgm:cxn modelId="{730F44F3-0F16-4DC7-94FF-A657B4144452}" type="presOf" srcId="{FF7302D4-DF56-4D05-A039-49D494387244}" destId="{97C6F11A-5991-412B-8918-0D15E3AC825F}" srcOrd="0" destOrd="1" presId="urn:microsoft.com/office/officeart/2005/8/layout/hierarchy3"/>
     <dgm:cxn modelId="{40756456-B1A5-4647-AF0B-6BC04E8D387D}" type="presParOf" srcId="{2655004E-649B-4D47-A2B9-0F2E94C643CB}" destId="{337FD4D9-A838-445B-9526-C66711C47A35}" srcOrd="0" destOrd="0" presId="urn:microsoft.com/office/officeart/2005/8/layout/hierarchy3"/>
     <dgm:cxn modelId="{BCE4A16B-AB27-4FA4-A6DD-B2C100F4B745}" type="presParOf" srcId="{337FD4D9-A838-445B-9526-C66711C47A35}" destId="{F50E9F67-7CBD-4601-8AA2-A892E09D1946}" srcOrd="0" destOrd="0" presId="urn:microsoft.com/office/officeart/2005/8/layout/hierarchy3"/>
     <dgm:cxn modelId="{4B6627DE-80EB-4875-A1ED-CE6CCC33067C}" type="presParOf" srcId="{F50E9F67-7CBD-4601-8AA2-A892E09D1946}" destId="{1F4999A6-8239-4781-8813-D424C1999DB7}" srcOrd="0" destOrd="0" presId="urn:microsoft.com/office/officeart/2005/8/layout/hierarchy3"/>
@@ -8694,14 +8664,14 @@
 </file>
 
 <file path=ppt/diagrams/drawing1.xml><?xml version="1.0" encoding="utf-8"?>
-<dgm:drawing xmlns:dgm="http://schemas.openxmlformats.org/drawingml/2006/diagram" xmlns:a="http://schemas.openxmlformats.org/drawingml/2006/main">
-  <dsp:spTree xmlns:dsp="http://schemas.microsoft.com/office/drawing/2008/diagram">
+<dsp:drawing xmlns:dgm="http://schemas.openxmlformats.org/drawingml/2006/diagram" xmlns:a="http://schemas.openxmlformats.org/drawingml/2006/main" xmlns:dsp="http://schemas.microsoft.com/office/drawing/2008/diagram">
+  <dsp:spTree>
     <dsp:nvGrpSpPr>
       <dsp:cNvPr id="0" name=""/>
       <dsp:cNvGrpSpPr/>
     </dsp:nvGrpSpPr>
     <dsp:grpSpPr/>
-    <dsp:sp modelId="{C897771F-DC93-4AD3-8C40-0F56AD012119}" macro="" textlink="">
+    <dsp:sp modelId="{C897771F-DC93-4AD3-8C40-0F56AD012119}">
       <dsp:nvSpPr>
         <dsp:cNvPr id="0" name=""/>
         <dsp:cNvSpPr/>
@@ -8759,7 +8729,7 @@
         <a:fontRef idx="minor"/>
       </dsp:style>
     </dsp:sp>
-    <dsp:sp modelId="{7067C38B-1810-4DB2-B807-5CCA43081905}" macro="" textlink="">
+    <dsp:sp modelId="{7067C38B-1810-4DB2-B807-5CCA43081905}">
       <dsp:nvSpPr>
         <dsp:cNvPr id="0" name=""/>
         <dsp:cNvSpPr/>
@@ -8820,7 +8790,7 @@
         <a:fontRef idx="minor"/>
       </dsp:style>
     </dsp:sp>
-    <dsp:sp modelId="{67F2C483-67D0-4A41-8A9B-9354F34B051C}" macro="" textlink="">
+    <dsp:sp modelId="{67F2C483-67D0-4A41-8A9B-9354F34B051C}">
       <dsp:nvSpPr>
         <dsp:cNvPr id="0" name=""/>
         <dsp:cNvSpPr/>
@@ -8881,7 +8851,7 @@
         <a:fontRef idx="minor"/>
       </dsp:style>
     </dsp:sp>
-    <dsp:sp modelId="{5F0C548B-D49C-4B81-89F6-6D921674CBC8}" macro="" textlink="">
+    <dsp:sp modelId="{5F0C548B-D49C-4B81-89F6-6D921674CBC8}">
       <dsp:nvSpPr>
         <dsp:cNvPr id="0" name=""/>
         <dsp:cNvSpPr/>
@@ -8939,7 +8909,7 @@
         <a:fontRef idx="minor"/>
       </dsp:style>
     </dsp:sp>
-    <dsp:sp modelId="{81A24B65-9686-48A3-8394-FE12A9A3486A}" macro="" textlink="">
+    <dsp:sp modelId="{81A24B65-9686-48A3-8394-FE12A9A3486A}">
       <dsp:nvSpPr>
         <dsp:cNvPr id="0" name=""/>
         <dsp:cNvSpPr/>
@@ -9000,7 +8970,7 @@
         <a:fontRef idx="minor"/>
       </dsp:style>
     </dsp:sp>
-    <dsp:sp modelId="{424B6412-A3F9-4720-A8EB-462E252393E7}" macro="" textlink="">
+    <dsp:sp modelId="{424B6412-A3F9-4720-A8EB-462E252393E7}">
       <dsp:nvSpPr>
         <dsp:cNvPr id="0" name=""/>
         <dsp:cNvSpPr/>
@@ -9058,7 +9028,7 @@
         <a:fontRef idx="minor"/>
       </dsp:style>
     </dsp:sp>
-    <dsp:sp modelId="{9D5B2E90-2AC1-455B-80B7-33F8B232A31B}" macro="" textlink="">
+    <dsp:sp modelId="{9D5B2E90-2AC1-455B-80B7-33F8B232A31B}">
       <dsp:nvSpPr>
         <dsp:cNvPr id="0" name=""/>
         <dsp:cNvSpPr/>
@@ -9119,7 +9089,7 @@
         <a:fontRef idx="minor"/>
       </dsp:style>
     </dsp:sp>
-    <dsp:sp modelId="{C36AD766-0A53-48DB-95A4-97671A3B4CB3}" macro="" textlink="">
+    <dsp:sp modelId="{C36AD766-0A53-48DB-95A4-97671A3B4CB3}">
       <dsp:nvSpPr>
         <dsp:cNvPr id="0" name=""/>
         <dsp:cNvSpPr/>
@@ -9238,7 +9208,7 @@
         <a:ext cx="1700104" cy="850052"/>
       </dsp:txXfrm>
     </dsp:sp>
-    <dsp:sp modelId="{8EB25D34-DFC9-49A5-A024-B06E604BE7C9}" macro="" textlink="">
+    <dsp:sp modelId="{8EB25D34-DFC9-49A5-A024-B06E604BE7C9}">
       <dsp:nvSpPr>
         <dsp:cNvPr id="0" name=""/>
         <dsp:cNvSpPr/>
@@ -9357,7 +9327,7 @@
         <a:ext cx="1700104" cy="850052"/>
       </dsp:txXfrm>
     </dsp:sp>
-    <dsp:sp modelId="{D46C28A6-FB4D-445D-9E8A-E8F532501D09}" macro="" textlink="">
+    <dsp:sp modelId="{D46C28A6-FB4D-445D-9E8A-E8F532501D09}">
       <dsp:nvSpPr>
         <dsp:cNvPr id="0" name=""/>
         <dsp:cNvSpPr/>
@@ -9476,7 +9446,7 @@
         <a:ext cx="1700104" cy="850052"/>
       </dsp:txXfrm>
     </dsp:sp>
-    <dsp:sp modelId="{7A4B2369-BDEA-49EF-9522-5EA17E36EC89}" macro="" textlink="">
+    <dsp:sp modelId="{7A4B2369-BDEA-49EF-9522-5EA17E36EC89}">
       <dsp:nvSpPr>
         <dsp:cNvPr id="0" name=""/>
         <dsp:cNvSpPr/>
@@ -9595,7 +9565,7 @@
         <a:ext cx="1700104" cy="850052"/>
       </dsp:txXfrm>
     </dsp:sp>
-    <dsp:sp modelId="{B47274DF-392A-43F8-A951-62E4C65D4027}" macro="" textlink="">
+    <dsp:sp modelId="{B47274DF-392A-43F8-A951-62E4C65D4027}">
       <dsp:nvSpPr>
         <dsp:cNvPr id="0" name=""/>
         <dsp:cNvSpPr/>
@@ -9714,7 +9684,7 @@
         <a:ext cx="1700104" cy="850052"/>
       </dsp:txXfrm>
     </dsp:sp>
-    <dsp:sp modelId="{FD21C7F4-091A-479B-ADF1-28E542D19193}" macro="" textlink="">
+    <dsp:sp modelId="{FD21C7F4-091A-479B-ADF1-28E542D19193}">
       <dsp:nvSpPr>
         <dsp:cNvPr id="0" name=""/>
         <dsp:cNvSpPr/>
@@ -9833,7 +9803,7 @@
         <a:ext cx="1700104" cy="850052"/>
       </dsp:txXfrm>
     </dsp:sp>
-    <dsp:sp modelId="{6AF72E91-D475-47FD-9F9A-F3F5486D3CA3}" macro="" textlink="">
+    <dsp:sp modelId="{6AF72E91-D475-47FD-9F9A-F3F5486D3CA3}">
       <dsp:nvSpPr>
         <dsp:cNvPr id="0" name=""/>
         <dsp:cNvSpPr/>
@@ -9952,7 +9922,7 @@
         <a:ext cx="1700104" cy="850052"/>
       </dsp:txXfrm>
     </dsp:sp>
-    <dsp:sp modelId="{6193E13E-2838-4FF4-95E4-B0E8E77986D7}" macro="" textlink="">
+    <dsp:sp modelId="{6193E13E-2838-4FF4-95E4-B0E8E77986D7}">
       <dsp:nvSpPr>
         <dsp:cNvPr id="0" name=""/>
         <dsp:cNvSpPr/>
@@ -10072,18 +10042,18 @@
       </dsp:txXfrm>
     </dsp:sp>
   </dsp:spTree>
-</dgm:drawing>
+</dsp:drawing>
 </file>
 
 <file path=ppt/diagrams/drawing2.xml><?xml version="1.0" encoding="utf-8"?>
-<dgm:drawing xmlns:dgm="http://schemas.openxmlformats.org/drawingml/2006/diagram" xmlns:a="http://schemas.openxmlformats.org/drawingml/2006/main">
-  <dsp:spTree xmlns:dsp="http://schemas.microsoft.com/office/drawing/2008/diagram">
+<dsp:drawing xmlns:dgm="http://schemas.openxmlformats.org/drawingml/2006/diagram" xmlns:a="http://schemas.openxmlformats.org/drawingml/2006/main" xmlns:dsp="http://schemas.microsoft.com/office/drawing/2008/diagram">
+  <dsp:spTree>
     <dsp:nvGrpSpPr>
       <dsp:cNvPr id="0" name=""/>
       <dsp:cNvGrpSpPr/>
     </dsp:nvGrpSpPr>
     <dsp:grpSpPr/>
-    <dsp:sp modelId="{FC2C4C26-EB23-46B9-B79F-E4E7DFE0BE29}" macro="" textlink="">
+    <dsp:sp modelId="{FC2C4C26-EB23-46B9-B79F-E4E7DFE0BE29}">
       <dsp:nvSpPr>
         <dsp:cNvPr id="0" name=""/>
         <dsp:cNvSpPr/>
@@ -10091,7 +10061,7 @@
       <dsp:spPr>
         <a:xfrm rot="16200000">
           <a:off x="-204853" y="208644"/>
-          <a:ext cx="4063999" cy="3646711"/>
+          <a:ext cx="4064000" cy="3646711"/>
         </a:xfrm>
         <a:prstGeom prst="flowChartManualOperation">
           <a:avLst/>
@@ -10269,13 +10239,7 @@
             <a:rPr lang="es-CL" sz="2200" kern="1200" dirty="0" smtClean="0">
               <a:latin typeface="Futura Lt BT"/>
             </a:rPr>
-            <a:t>SQL </a:t>
-          </a:r>
-          <a:r>
-            <a:rPr lang="es-CL" sz="2200" kern="1200" dirty="0" smtClean="0">
-              <a:latin typeface="Futura Lt BT"/>
-            </a:rPr>
-            <a:t>Server 2005</a:t>
+            <a:t>SQL Server 2005</a:t>
           </a:r>
           <a:endParaRPr lang="es-CL" sz="2200" kern="1200" dirty="0">
             <a:latin typeface="Futura Lt BT"/>
@@ -10284,10 +10248,10 @@
       </dsp:txBody>
       <dsp:txXfrm rot="16200000">
         <a:off x="-204853" y="208644"/>
-        <a:ext cx="4063999" cy="3646711"/>
+        <a:ext cx="4064000" cy="3646711"/>
       </dsp:txXfrm>
     </dsp:sp>
-    <dsp:sp modelId="{6B7D2FE9-FA86-4E82-9996-41C9EC07B79C}" macro="" textlink="">
+    <dsp:sp modelId="{6B7D2FE9-FA86-4E82-9996-41C9EC07B79C}">
       <dsp:nvSpPr>
         <dsp:cNvPr id="0" name=""/>
         <dsp:cNvSpPr/>
@@ -10486,18 +10450,18 @@
       </dsp:txXfrm>
     </dsp:sp>
   </dsp:spTree>
-</dgm:drawing>
+</dsp:drawing>
 </file>
 
 <file path=ppt/diagrams/drawing3.xml><?xml version="1.0" encoding="utf-8"?>
-<dgm:drawing xmlns:dgm="http://schemas.openxmlformats.org/drawingml/2006/diagram" xmlns:a="http://schemas.openxmlformats.org/drawingml/2006/main">
-  <dsp:spTree xmlns:dsp="http://schemas.microsoft.com/office/drawing/2008/diagram">
+<dsp:drawing xmlns:dgm="http://schemas.openxmlformats.org/drawingml/2006/diagram" xmlns:a="http://schemas.openxmlformats.org/drawingml/2006/main" xmlns:dsp="http://schemas.microsoft.com/office/drawing/2008/diagram">
+  <dsp:spTree>
     <dsp:nvGrpSpPr>
       <dsp:cNvPr id="0" name=""/>
       <dsp:cNvGrpSpPr/>
     </dsp:nvGrpSpPr>
     <dsp:grpSpPr/>
-    <dsp:sp modelId="{FC2C4C26-EB23-46B9-B79F-E4E7DFE0BE29}" macro="" textlink="">
+    <dsp:sp modelId="{FC2C4C26-EB23-46B9-B79F-E4E7DFE0BE29}">
       <dsp:nvSpPr>
         <dsp:cNvPr id="0" name=""/>
         <dsp:cNvSpPr/>
@@ -10787,7 +10751,7 @@
         <a:ext cx="4667532" cy="3745270"/>
       </dsp:txXfrm>
     </dsp:sp>
-    <dsp:sp modelId="{6B7D2FE9-FA86-4E82-9996-41C9EC07B79C}" macro="" textlink="">
+    <dsp:sp modelId="{6B7D2FE9-FA86-4E82-9996-41C9EC07B79C}">
       <dsp:nvSpPr>
         <dsp:cNvPr id="0" name=""/>
         <dsp:cNvSpPr/>
@@ -11009,18 +10973,18 @@
       </dsp:txXfrm>
     </dsp:sp>
   </dsp:spTree>
-</dgm:drawing>
+</dsp:drawing>
 </file>
 
 <file path=ppt/diagrams/drawing4.xml><?xml version="1.0" encoding="utf-8"?>
-<dgm:drawing xmlns:dgm="http://schemas.openxmlformats.org/drawingml/2006/diagram" xmlns:a="http://schemas.openxmlformats.org/drawingml/2006/main">
-  <dsp:spTree xmlns:dsp="http://schemas.microsoft.com/office/drawing/2008/diagram">
+<dsp:drawing xmlns:dgm="http://schemas.openxmlformats.org/drawingml/2006/diagram" xmlns:a="http://schemas.openxmlformats.org/drawingml/2006/main" xmlns:dsp="http://schemas.microsoft.com/office/drawing/2008/diagram">
+  <dsp:spTree>
     <dsp:nvGrpSpPr>
       <dsp:cNvPr id="0" name=""/>
       <dsp:cNvGrpSpPr/>
     </dsp:nvGrpSpPr>
     <dsp:grpSpPr/>
-    <dsp:sp modelId="{1F4999A6-8239-4781-8813-D424C1999DB7}" macro="" textlink="">
+    <dsp:sp modelId="{1F4999A6-8239-4781-8813-D424C1999DB7}">
       <dsp:nvSpPr>
         <dsp:cNvPr id="0" name=""/>
         <dsp:cNvSpPr/>
@@ -11128,7 +11092,7 @@
         <a:ext cx="2069648" cy="1034824"/>
       </dsp:txXfrm>
     </dsp:sp>
-    <dsp:sp modelId="{F04531A8-0E0E-456F-8029-5DF1AED475F4}" macro="" textlink="">
+    <dsp:sp modelId="{F04531A8-0E0E-456F-8029-5DF1AED475F4}">
       <dsp:nvSpPr>
         <dsp:cNvPr id="0" name=""/>
         <dsp:cNvSpPr/>
@@ -11186,7 +11150,7 @@
         <a:fontRef idx="minor"/>
       </dsp:style>
     </dsp:sp>
-    <dsp:sp modelId="{0BC3153B-8F28-4275-89FA-295C7B170D4D}" macro="" textlink="">
+    <dsp:sp modelId="{0BC3153B-8F28-4275-89FA-295C7B170D4D}">
       <dsp:nvSpPr>
         <dsp:cNvPr id="0" name=""/>
         <dsp:cNvSpPr/>
@@ -11257,19 +11221,7 @@
             <a:rPr lang="es-CL" sz="1800" kern="1200" dirty="0" smtClean="0">
               <a:latin typeface="Futura Lt BT"/>
             </a:rPr>
-            <a:t>SQL </a:t>
-          </a:r>
-          <a:r>
-            <a:rPr lang="es-CL" sz="1800" kern="1200" dirty="0" smtClean="0">
-              <a:latin typeface="Futura Lt BT"/>
-            </a:rPr>
-            <a:t>Server 2005 </a:t>
-          </a:r>
-          <a:r>
-            <a:rPr lang="es-CL" sz="1800" kern="1200" dirty="0" smtClean="0">
-              <a:latin typeface="Futura Lt BT"/>
-            </a:rPr>
-            <a:t>Estándar</a:t>
+            <a:t>SQL Server 2005 Estándar</a:t>
           </a:r>
           <a:endParaRPr lang="es-CL" sz="1800" kern="1200" dirty="0">
             <a:latin typeface="Futura Lt BT"/>
@@ -11304,7 +11256,7 @@
         <a:ext cx="1655718" cy="1034824"/>
       </dsp:txXfrm>
     </dsp:sp>
-    <dsp:sp modelId="{68061971-2FEF-4ACD-8852-8391D8261656}" macro="" textlink="">
+    <dsp:sp modelId="{68061971-2FEF-4ACD-8852-8391D8261656}">
       <dsp:nvSpPr>
         <dsp:cNvPr id="0" name=""/>
         <dsp:cNvSpPr/>
@@ -11362,7 +11314,7 @@
         <a:fontRef idx="minor"/>
       </dsp:style>
     </dsp:sp>
-    <dsp:sp modelId="{59A576FD-DEA1-4973-B0CA-89D07BC9EE75}" macro="" textlink="">
+    <dsp:sp modelId="{59A576FD-DEA1-4973-B0CA-89D07BC9EE75}">
       <dsp:nvSpPr>
         <dsp:cNvPr id="0" name=""/>
         <dsp:cNvSpPr/>
@@ -11433,19 +11385,7 @@
             <a:rPr lang="es-CL" sz="1800" kern="1200" dirty="0" smtClean="0">
               <a:latin typeface="Futura Lt BT"/>
             </a:rPr>
-            <a:t>SQL </a:t>
-          </a:r>
-          <a:r>
-            <a:rPr lang="es-CL" sz="1800" kern="1200" dirty="0" smtClean="0">
-              <a:latin typeface="Futura Lt BT"/>
-            </a:rPr>
-            <a:t>Server 2005 </a:t>
-          </a:r>
-          <a:r>
-            <a:rPr lang="es-CL" sz="1800" kern="1200" dirty="0" smtClean="0">
-              <a:latin typeface="Futura Lt BT"/>
-            </a:rPr>
-            <a:t>Express</a:t>
+            <a:t>SQL Server 2005 Express</a:t>
           </a:r>
           <a:endParaRPr lang="es-CL" sz="1800" kern="1200" dirty="0">
             <a:latin typeface="Futura Lt BT"/>
@@ -11480,7 +11420,7 @@
         <a:ext cx="1655718" cy="1034824"/>
       </dsp:txXfrm>
     </dsp:sp>
-    <dsp:sp modelId="{CEE56D0B-B5B3-4DC1-B7C4-3E4B6CE09745}" macro="" textlink="">
+    <dsp:sp modelId="{CEE56D0B-B5B3-4DC1-B7C4-3E4B6CE09745}">
       <dsp:nvSpPr>
         <dsp:cNvPr id="0" name=""/>
         <dsp:cNvSpPr/>
@@ -11588,7 +11528,7 @@
         <a:ext cx="2069648" cy="1034824"/>
       </dsp:txXfrm>
     </dsp:sp>
-    <dsp:sp modelId="{669266AF-E596-40CA-B9F3-BAFD198E1E3F}" macro="" textlink="">
+    <dsp:sp modelId="{669266AF-E596-40CA-B9F3-BAFD198E1E3F}">
       <dsp:nvSpPr>
         <dsp:cNvPr id="0" name=""/>
         <dsp:cNvSpPr/>
@@ -11646,7 +11586,7 @@
         <a:fontRef idx="minor"/>
       </dsp:style>
     </dsp:sp>
-    <dsp:sp modelId="{97C6F11A-5991-412B-8918-0D15E3AC825F}" macro="" textlink="">
+    <dsp:sp modelId="{97C6F11A-5991-412B-8918-0D15E3AC825F}">
       <dsp:nvSpPr>
         <dsp:cNvPr id="0" name=""/>
         <dsp:cNvSpPr/>
@@ -11752,7 +11692,7 @@
         <a:ext cx="1655718" cy="1034824"/>
       </dsp:txXfrm>
     </dsp:sp>
-    <dsp:sp modelId="{34A1F7D0-9E75-4E0D-8D40-3106DAC779EC}" macro="" textlink="">
+    <dsp:sp modelId="{34A1F7D0-9E75-4E0D-8D40-3106DAC779EC}">
       <dsp:nvSpPr>
         <dsp:cNvPr id="0" name=""/>
         <dsp:cNvSpPr/>
@@ -11810,7 +11750,7 @@
         <a:fontRef idx="minor"/>
       </dsp:style>
     </dsp:sp>
-    <dsp:sp modelId="{C98D2BE6-398C-4DC5-B4E1-62EBCCB9DEC5}" macro="" textlink="">
+    <dsp:sp modelId="{C98D2BE6-398C-4DC5-B4E1-62EBCCB9DEC5}">
       <dsp:nvSpPr>
         <dsp:cNvPr id="0" name=""/>
         <dsp:cNvSpPr/>
@@ -11917,18 +11857,18 @@
       </dsp:txXfrm>
     </dsp:sp>
   </dsp:spTree>
-</dgm:drawing>
+</dsp:drawing>
 </file>
 
 <file path=ppt/diagrams/drawing5.xml><?xml version="1.0" encoding="utf-8"?>
-<dgm:drawing xmlns:dgm="http://schemas.openxmlformats.org/drawingml/2006/diagram" xmlns:a="http://schemas.openxmlformats.org/drawingml/2006/main">
-  <dsp:spTree xmlns:dsp="http://schemas.microsoft.com/office/drawing/2008/diagram">
+<dsp:drawing xmlns:dgm="http://schemas.openxmlformats.org/drawingml/2006/diagram" xmlns:a="http://schemas.openxmlformats.org/drawingml/2006/main" xmlns:dsp="http://schemas.microsoft.com/office/drawing/2008/diagram">
+  <dsp:spTree>
     <dsp:nvGrpSpPr>
       <dsp:cNvPr id="0" name=""/>
       <dsp:cNvGrpSpPr/>
     </dsp:nvGrpSpPr>
     <dsp:grpSpPr/>
-    <dsp:sp modelId="{25C28955-7066-4C2E-BFD1-AC5B4C6E6806}" macro="" textlink="">
+    <dsp:sp modelId="{25C28955-7066-4C2E-BFD1-AC5B4C6E6806}">
       <dsp:nvSpPr>
         <dsp:cNvPr id="0" name=""/>
         <dsp:cNvSpPr/>
@@ -12049,7 +11989,7 @@
         <a:ext cx="8456413" cy="883130"/>
       </dsp:txXfrm>
     </dsp:sp>
-    <dsp:sp modelId="{40309438-7423-4300-AFFA-25C817D86DDD}" macro="" textlink="">
+    <dsp:sp modelId="{40309438-7423-4300-AFFA-25C817D86DDD}">
       <dsp:nvSpPr>
         <dsp:cNvPr id="0" name=""/>
         <dsp:cNvSpPr/>
@@ -12168,7 +12108,7 @@
         <a:ext cx="1022170" cy="883130"/>
       </dsp:txXfrm>
     </dsp:sp>
-    <dsp:sp modelId="{7F7F210A-07D7-480E-AE58-DB716CBE9009}" macro="" textlink="">
+    <dsp:sp modelId="{7F7F210A-07D7-480E-AE58-DB716CBE9009}">
       <dsp:nvSpPr>
         <dsp:cNvPr id="0" name=""/>
         <dsp:cNvSpPr/>
@@ -12287,7 +12227,7 @@
         <a:ext cx="1022170" cy="883130"/>
       </dsp:txXfrm>
     </dsp:sp>
-    <dsp:sp modelId="{AADBF77C-178E-4139-8C67-FCE5DFA99823}" macro="" textlink="">
+    <dsp:sp modelId="{AADBF77C-178E-4139-8C67-FCE5DFA99823}">
       <dsp:nvSpPr>
         <dsp:cNvPr id="0" name=""/>
         <dsp:cNvSpPr/>
@@ -12406,7 +12346,7 @@
         <a:ext cx="6240348" cy="883130"/>
       </dsp:txXfrm>
     </dsp:sp>
-    <dsp:sp modelId="{611BF421-F454-4287-A431-48516D67493F}" macro="" textlink="">
+    <dsp:sp modelId="{611BF421-F454-4287-A431-48516D67493F}">
       <dsp:nvSpPr>
         <dsp:cNvPr id="0" name=""/>
         <dsp:cNvSpPr/>
@@ -12525,7 +12465,7 @@
         <a:ext cx="6240348" cy="883130"/>
       </dsp:txXfrm>
     </dsp:sp>
-    <dsp:sp modelId="{952EDF37-CE28-4FE6-8BD5-FC4293EA5855}" macro="" textlink="">
+    <dsp:sp modelId="{952EDF37-CE28-4FE6-8BD5-FC4293EA5855}">
       <dsp:nvSpPr>
         <dsp:cNvPr id="0" name=""/>
         <dsp:cNvSpPr/>
@@ -12644,7 +12584,7 @@
         <a:ext cx="1022170" cy="883130"/>
       </dsp:txXfrm>
     </dsp:sp>
-    <dsp:sp modelId="{F3CD9F44-478F-4DA4-8E9B-26D44E92D5FC}" macro="" textlink="">
+    <dsp:sp modelId="{F3CD9F44-478F-4DA4-8E9B-26D44E92D5FC}">
       <dsp:nvSpPr>
         <dsp:cNvPr id="0" name=""/>
         <dsp:cNvSpPr/>
@@ -12763,7 +12703,7 @@
         <a:ext cx="1022170" cy="883130"/>
       </dsp:txXfrm>
     </dsp:sp>
-    <dsp:sp modelId="{244A69D9-6CC8-4087-AF96-9B56DD27CD25}" macro="" textlink="">
+    <dsp:sp modelId="{244A69D9-6CC8-4087-AF96-9B56DD27CD25}">
       <dsp:nvSpPr>
         <dsp:cNvPr id="0" name=""/>
         <dsp:cNvSpPr/>
@@ -12882,7 +12822,7 @@
         <a:ext cx="1022170" cy="883130"/>
       </dsp:txXfrm>
     </dsp:sp>
-    <dsp:sp modelId="{F22370EF-86CC-4C21-96DF-D8DD58F1673C}" macro="" textlink="">
+    <dsp:sp modelId="{F22370EF-86CC-4C21-96DF-D8DD58F1673C}">
       <dsp:nvSpPr>
         <dsp:cNvPr id="0" name=""/>
         <dsp:cNvSpPr/>
@@ -13001,7 +12941,7 @@
         <a:ext cx="4153077" cy="883130"/>
       </dsp:txXfrm>
     </dsp:sp>
-    <dsp:sp modelId="{589FBF1F-7F45-4CE4-9047-159C42071C50}" macro="" textlink="">
+    <dsp:sp modelId="{589FBF1F-7F45-4CE4-9047-159C42071C50}">
       <dsp:nvSpPr>
         <dsp:cNvPr id="0" name=""/>
         <dsp:cNvSpPr/>
@@ -13120,7 +13060,7 @@
         <a:ext cx="1022170" cy="883130"/>
       </dsp:txXfrm>
     </dsp:sp>
-    <dsp:sp modelId="{4CE52578-7C2A-407C-ADEC-05AE734C9137}" macro="" textlink="">
+    <dsp:sp modelId="{4CE52578-7C2A-407C-ADEC-05AE734C9137}">
       <dsp:nvSpPr>
         <dsp:cNvPr id="0" name=""/>
         <dsp:cNvSpPr/>
@@ -13239,7 +13179,7 @@
         <a:ext cx="1022170" cy="883130"/>
       </dsp:txXfrm>
     </dsp:sp>
-    <dsp:sp modelId="{BFA502BE-2E62-4080-8208-1E5E98B7B990}" macro="" textlink="">
+    <dsp:sp modelId="{BFA502BE-2E62-4080-8208-1E5E98B7B990}">
       <dsp:nvSpPr>
         <dsp:cNvPr id="0" name=""/>
         <dsp:cNvSpPr/>
@@ -13358,7 +13298,7 @@
         <a:ext cx="1022170" cy="883130"/>
       </dsp:txXfrm>
     </dsp:sp>
-    <dsp:sp modelId="{359DCAA5-DE04-4E6A-AD9D-31FC80443D67}" macro="" textlink="">
+    <dsp:sp modelId="{359DCAA5-DE04-4E6A-AD9D-31FC80443D67}">
       <dsp:nvSpPr>
         <dsp:cNvPr id="0" name=""/>
         <dsp:cNvSpPr/>
@@ -13478,7 +13418,7 @@
       </dsp:txXfrm>
     </dsp:sp>
   </dsp:spTree>
-</dgm:drawing>
+</dsp:drawing>
 </file>
 
 <file path=ppt/diagrams/layout1.xml><?xml version="1.0" encoding="utf-8"?>
@@ -31153,87 +31093,44 @@
                 <a:latin typeface="Arial" pitchFamily="34" charset="0"/>
                 <a:cs typeface="Arial" pitchFamily="34" charset="0"/>
               </a:rPr>
-              <a:t>Casos de uso</a:t>
+              <a:t>Modelo de datos, orden trabajo</a:t>
             </a:r>
-            <a:endParaRPr lang="es-CL" sz="2800" b="1" cap="all" dirty="0">
-              <a:ln w="9000" cmpd="sng">
-                <a:solidFill>
-                  <a:schemeClr val="accent4">
-                    <a:shade val="50000"/>
-                    <a:satMod val="120000"/>
-                  </a:schemeClr>
-                </a:solidFill>
-                <a:prstDash val="solid"/>
-              </a:ln>
-              <a:gradFill>
-                <a:gsLst>
-                  <a:gs pos="0">
-                    <a:schemeClr val="accent4">
-                      <a:shade val="20000"/>
-                      <a:satMod val="245000"/>
-                    </a:schemeClr>
-                  </a:gs>
-                  <a:gs pos="43000">
-                    <a:schemeClr val="accent4">
-                      <a:satMod val="255000"/>
-                    </a:schemeClr>
-                  </a:gs>
-                  <a:gs pos="48000">
-                    <a:schemeClr val="accent4">
-                      <a:shade val="85000"/>
-                      <a:satMod val="255000"/>
-                    </a:schemeClr>
-                  </a:gs>
-                  <a:gs pos="100000">
-                    <a:schemeClr val="accent4">
-                      <a:shade val="20000"/>
-                      <a:satMod val="245000"/>
-                    </a:schemeClr>
-                  </a:gs>
-                </a:gsLst>
-                <a:lin ang="5400000"/>
-              </a:gradFill>
-              <a:effectLst>
-                <a:reflection blurRad="12700" stA="28000" endPos="45000" dist="1000" dir="5400000" sy="-100000" algn="bl" rotWithShape="0"/>
-              </a:effectLst>
-              <a:latin typeface="Arial" pitchFamily="34" charset="0"/>
-              <a:cs typeface="Arial" pitchFamily="34" charset="0"/>
-            </a:endParaRPr>
           </a:p>
         </p:txBody>
       </p:sp>
       <p:pic>
         <p:nvPicPr>
-          <p:cNvPr id="8" name="8 Imagen" descr="casoUso.png"/>
-          <p:cNvPicPr/>
-          <p:nvPr/>
+          <p:cNvPr id="11" name="10 Marcador de contenido" descr="modeloOrden.png"/>
+          <p:cNvPicPr>
+            <a:picLocks noGrp="1" noChangeAspect="1"/>
+          </p:cNvPicPr>
+          <p:nvPr>
+            <p:ph idx="1"/>
+          </p:nvPr>
         </p:nvPicPr>
         <p:blipFill>
           <a:blip r:embed="rId3" cstate="print">
-            <a:lum bright="-20000" contrast="40000"/>
+            <a:clrChange>
+              <a:clrFrom>
+                <a:srgbClr val="FFFFFF"/>
+              </a:clrFrom>
+              <a:clrTo>
+                <a:srgbClr val="FFFFFF">
+                  <a:alpha val="0"/>
+                </a:srgbClr>
+              </a:clrTo>
+            </a:clrChange>
           </a:blip>
+          <a:srcRect r="51932" b="36391"/>
           <a:stretch>
             <a:fillRect/>
           </a:stretch>
         </p:blipFill>
         <p:spPr>
           <a:xfrm>
-            <a:off x="1351128" y="1195387"/>
-            <a:ext cx="6796585" cy="4467225"/>
+            <a:off x="192815" y="1187359"/>
+            <a:ext cx="8869297" cy="4858604"/>
           </a:xfrm>
-          <a:prstGeom prst="rect">
-            <a:avLst/>
-          </a:prstGeom>
-          <a:ln>
-            <a:noFill/>
-          </a:ln>
-          <a:effectLst>
-            <a:outerShdw blurRad="292100" dist="139700" dir="2700000" algn="tl" rotWithShape="0">
-              <a:srgbClr val="333333">
-                <a:alpha val="65000"/>
-              </a:srgbClr>
-            </a:outerShdw>
-          </a:effectLst>
         </p:spPr>
       </p:pic>
     </p:spTree>
@@ -31336,44 +31233,87 @@
                 <a:latin typeface="Arial" pitchFamily="34" charset="0"/>
                 <a:cs typeface="Arial" pitchFamily="34" charset="0"/>
               </a:rPr>
-              <a:t>Modelo de datos, orden trabajo</a:t>
+              <a:t>Casos de uso</a:t>
             </a:r>
+            <a:endParaRPr lang="es-CL" sz="2800" b="1" cap="all" dirty="0">
+              <a:ln w="9000" cmpd="sng">
+                <a:solidFill>
+                  <a:schemeClr val="accent4">
+                    <a:shade val="50000"/>
+                    <a:satMod val="120000"/>
+                  </a:schemeClr>
+                </a:solidFill>
+                <a:prstDash val="solid"/>
+              </a:ln>
+              <a:gradFill>
+                <a:gsLst>
+                  <a:gs pos="0">
+                    <a:schemeClr val="accent4">
+                      <a:shade val="20000"/>
+                      <a:satMod val="245000"/>
+                    </a:schemeClr>
+                  </a:gs>
+                  <a:gs pos="43000">
+                    <a:schemeClr val="accent4">
+                      <a:satMod val="255000"/>
+                    </a:schemeClr>
+                  </a:gs>
+                  <a:gs pos="48000">
+                    <a:schemeClr val="accent4">
+                      <a:shade val="85000"/>
+                      <a:satMod val="255000"/>
+                    </a:schemeClr>
+                  </a:gs>
+                  <a:gs pos="100000">
+                    <a:schemeClr val="accent4">
+                      <a:shade val="20000"/>
+                      <a:satMod val="245000"/>
+                    </a:schemeClr>
+                  </a:gs>
+                </a:gsLst>
+                <a:lin ang="5400000"/>
+              </a:gradFill>
+              <a:effectLst>
+                <a:reflection blurRad="12700" stA="28000" endPos="45000" dist="1000" dir="5400000" sy="-100000" algn="bl" rotWithShape="0"/>
+              </a:effectLst>
+              <a:latin typeface="Arial" pitchFamily="34" charset="0"/>
+              <a:cs typeface="Arial" pitchFamily="34" charset="0"/>
+            </a:endParaRPr>
           </a:p>
         </p:txBody>
       </p:sp>
       <p:pic>
         <p:nvPicPr>
-          <p:cNvPr id="11" name="10 Marcador de contenido" descr="modeloOrden.png"/>
-          <p:cNvPicPr>
-            <a:picLocks noGrp="1" noChangeAspect="1"/>
-          </p:cNvPicPr>
-          <p:nvPr>
-            <p:ph idx="1"/>
-          </p:nvPr>
+          <p:cNvPr id="8" name="8 Imagen" descr="casoUso.png"/>
+          <p:cNvPicPr/>
+          <p:nvPr/>
         </p:nvPicPr>
         <p:blipFill>
           <a:blip r:embed="rId3" cstate="print">
-            <a:clrChange>
-              <a:clrFrom>
-                <a:srgbClr val="FFFFFF"/>
-              </a:clrFrom>
-              <a:clrTo>
-                <a:srgbClr val="FFFFFF">
-                  <a:alpha val="0"/>
-                </a:srgbClr>
-              </a:clrTo>
-            </a:clrChange>
+            <a:lum bright="-20000" contrast="40000"/>
           </a:blip>
-          <a:srcRect r="51932" b="36391"/>
           <a:stretch>
             <a:fillRect/>
           </a:stretch>
         </p:blipFill>
         <p:spPr>
           <a:xfrm>
-            <a:off x="192815" y="1187359"/>
-            <a:ext cx="8869297" cy="4858604"/>
+            <a:off x="1351128" y="1195387"/>
+            <a:ext cx="6796585" cy="4467225"/>
           </a:xfrm>
+          <a:prstGeom prst="rect">
+            <a:avLst/>
+          </a:prstGeom>
+          <a:ln>
+            <a:noFill/>
+          </a:ln>
+          <a:effectLst>
+            <a:outerShdw blurRad="292100" dist="139700" dir="2700000" algn="tl" rotWithShape="0">
+              <a:srgbClr val="333333">
+                <a:alpha val="65000"/>
+              </a:srgbClr>
+            </a:outerShdw>
+          </a:effectLst>
         </p:spPr>
       </p:pic>
     </p:spTree>

</xml_diff>